<commit_message>
need to implement demo and complete power point now(correspond to the article-DenStream)
</commit_message>
<xml_diff>
--- a/Presentation/Data Mining in clustering.pptx
+++ b/Presentation/Data Mining in clustering.pptx
@@ -26,9 +26,10 @@
     <p:sldId id="278" r:id="rId20"/>
     <p:sldId id="277" r:id="rId21"/>
     <p:sldId id="274" r:id="rId22"/>
-    <p:sldId id="264" r:id="rId23"/>
-    <p:sldId id="265" r:id="rId24"/>
-    <p:sldId id="279" r:id="rId25"/>
+    <p:sldId id="280" r:id="rId23"/>
+    <p:sldId id="264" r:id="rId24"/>
+    <p:sldId id="265" r:id="rId25"/>
+    <p:sldId id="279" r:id="rId26"/>
   </p:sldIdLst>
   <p:sldSz cx="12192000" cy="6858000"/>
   <p:notesSz cx="6858000" cy="9144000"/>
@@ -637,7 +638,7 @@
           <a:p>
             <a:fld id="{EE5836F5-1E6B-4492-88E9-2DB89131BE1F}" type="datetimeFigureOut">
               <a:rPr lang="en-US" smtClean="0"/>
-              <a:t>06-Dec-23</a:t>
+              <a:t>12/8/2023</a:t>
             </a:fld>
             <a:endParaRPr lang="en-US"/>
           </a:p>
@@ -933,7 +934,7 @@
           <a:p>
             <a:fld id="{EE5836F5-1E6B-4492-88E9-2DB89131BE1F}" type="datetimeFigureOut">
               <a:rPr lang="en-US" smtClean="0"/>
-              <a:t>06-Dec-23</a:t>
+              <a:t>12/8/2023</a:t>
             </a:fld>
             <a:endParaRPr lang="en-US"/>
           </a:p>
@@ -1181,7 +1182,7 @@
           <a:p>
             <a:fld id="{EE5836F5-1E6B-4492-88E9-2DB89131BE1F}" type="datetimeFigureOut">
               <a:rPr lang="en-US" smtClean="0"/>
-              <a:t>06-Dec-23</a:t>
+              <a:t>12/8/2023</a:t>
             </a:fld>
             <a:endParaRPr lang="en-US"/>
           </a:p>
@@ -1721,7 +1722,7 @@
           <a:p>
             <a:fld id="{EE5836F5-1E6B-4492-88E9-2DB89131BE1F}" type="datetimeFigureOut">
               <a:rPr lang="en-US" smtClean="0"/>
-              <a:t>06-Dec-23</a:t>
+              <a:t>12/8/2023</a:t>
             </a:fld>
             <a:endParaRPr lang="en-US"/>
           </a:p>
@@ -1969,7 +1970,7 @@
           <a:p>
             <a:fld id="{EE5836F5-1E6B-4492-88E9-2DB89131BE1F}" type="datetimeFigureOut">
               <a:rPr lang="en-US" smtClean="0"/>
-              <a:t>06-Dec-23</a:t>
+              <a:t>12/8/2023</a:t>
             </a:fld>
             <a:endParaRPr lang="en-US"/>
           </a:p>
@@ -2501,7 +2502,7 @@
           <a:p>
             <a:fld id="{EE5836F5-1E6B-4492-88E9-2DB89131BE1F}" type="datetimeFigureOut">
               <a:rPr lang="en-US" smtClean="0"/>
-              <a:t>06-Dec-23</a:t>
+              <a:t>12/8/2023</a:t>
             </a:fld>
             <a:endParaRPr lang="en-US"/>
           </a:p>
@@ -2798,7 +2799,7 @@
           <a:p>
             <a:fld id="{EE5836F5-1E6B-4492-88E9-2DB89131BE1F}" type="datetimeFigureOut">
               <a:rPr lang="en-US" smtClean="0"/>
-              <a:t>06-Dec-23</a:t>
+              <a:t>12/8/2023</a:t>
             </a:fld>
             <a:endParaRPr lang="en-US"/>
           </a:p>
@@ -2972,7 +2973,7 @@
           <a:p>
             <a:fld id="{EE5836F5-1E6B-4492-88E9-2DB89131BE1F}" type="datetimeFigureOut">
               <a:rPr lang="en-US" smtClean="0"/>
-              <a:t>06-Dec-23</a:t>
+              <a:t>12/8/2023</a:t>
             </a:fld>
             <a:endParaRPr lang="en-US"/>
           </a:p>
@@ -3152,7 +3153,7 @@
           <a:p>
             <a:fld id="{EE5836F5-1E6B-4492-88E9-2DB89131BE1F}" type="datetimeFigureOut">
               <a:rPr lang="en-US" smtClean="0"/>
-              <a:t>06-Dec-23</a:t>
+              <a:t>12/8/2023</a:t>
             </a:fld>
             <a:endParaRPr lang="en-US"/>
           </a:p>
@@ -3322,7 +3323,7 @@
           <a:p>
             <a:fld id="{EE5836F5-1E6B-4492-88E9-2DB89131BE1F}" type="datetimeFigureOut">
               <a:rPr lang="en-US" smtClean="0"/>
-              <a:t>06-Dec-23</a:t>
+              <a:t>12/8/2023</a:t>
             </a:fld>
             <a:endParaRPr lang="en-US"/>
           </a:p>
@@ -3573,7 +3574,7 @@
           <a:p>
             <a:fld id="{EE5836F5-1E6B-4492-88E9-2DB89131BE1F}" type="datetimeFigureOut">
               <a:rPr lang="en-US" smtClean="0"/>
-              <a:t>06-Dec-23</a:t>
+              <a:t>12/8/2023</a:t>
             </a:fld>
             <a:endParaRPr lang="en-US"/>
           </a:p>
@@ -3870,7 +3871,7 @@
           <a:p>
             <a:fld id="{EE5836F5-1E6B-4492-88E9-2DB89131BE1F}" type="datetimeFigureOut">
               <a:rPr lang="en-US" smtClean="0"/>
-              <a:t>06-Dec-23</a:t>
+              <a:t>12/8/2023</a:t>
             </a:fld>
             <a:endParaRPr lang="en-US"/>
           </a:p>
@@ -4312,7 +4313,7 @@
           <a:p>
             <a:fld id="{EE5836F5-1E6B-4492-88E9-2DB89131BE1F}" type="datetimeFigureOut">
               <a:rPr lang="en-US" smtClean="0"/>
-              <a:t>06-Dec-23</a:t>
+              <a:t>12/8/2023</a:t>
             </a:fld>
             <a:endParaRPr lang="en-US"/>
           </a:p>
@@ -4430,7 +4431,7 @@
           <a:p>
             <a:fld id="{EE5836F5-1E6B-4492-88E9-2DB89131BE1F}" type="datetimeFigureOut">
               <a:rPr lang="en-US" smtClean="0"/>
-              <a:t>06-Dec-23</a:t>
+              <a:t>12/8/2023</a:t>
             </a:fld>
             <a:endParaRPr lang="en-US"/>
           </a:p>
@@ -4525,7 +4526,7 @@
           <a:p>
             <a:fld id="{EE5836F5-1E6B-4492-88E9-2DB89131BE1F}" type="datetimeFigureOut">
               <a:rPr lang="en-US" smtClean="0"/>
-              <a:t>06-Dec-23</a:t>
+              <a:t>12/8/2023</a:t>
             </a:fld>
             <a:endParaRPr lang="en-US"/>
           </a:p>
@@ -4808,7 +4809,7 @@
           <a:p>
             <a:fld id="{EE5836F5-1E6B-4492-88E9-2DB89131BE1F}" type="datetimeFigureOut">
               <a:rPr lang="en-US" smtClean="0"/>
-              <a:t>06-Dec-23</a:t>
+              <a:t>12/8/2023</a:t>
             </a:fld>
             <a:endParaRPr lang="en-US"/>
           </a:p>
@@ -5099,7 +5100,7 @@
           <a:p>
             <a:fld id="{EE5836F5-1E6B-4492-88E9-2DB89131BE1F}" type="datetimeFigureOut">
               <a:rPr lang="en-US" smtClean="0"/>
-              <a:t>06-Dec-23</a:t>
+              <a:t>12/8/2023</a:t>
             </a:fld>
             <a:endParaRPr lang="en-US"/>
           </a:p>
@@ -5629,7 +5630,7 @@
           <a:p>
             <a:fld id="{EE5836F5-1E6B-4492-88E9-2DB89131BE1F}" type="datetimeFigureOut">
               <a:rPr lang="en-US" smtClean="0"/>
-              <a:t>06-Dec-23</a:t>
+              <a:t>12/8/2023</a:t>
             </a:fld>
             <a:endParaRPr lang="en-US"/>
           </a:p>
@@ -7459,7 +7460,7 @@
         <p:spPr/>
         <p:txBody>
           <a:bodyPr>
-            <a:normAutofit/>
+            <a:normAutofit fontScale="92500"/>
           </a:bodyPr>
           <a:lstStyle/>
           <a:p>
@@ -8644,7 +8645,7 @@
           <p:cNvPr id="2" name="Title 1">
             <a:extLst>
               <a:ext uri="{FF2B5EF4-FFF2-40B4-BE49-F238E27FC236}">
-                <a16:creationId xmlns:a16="http://schemas.microsoft.com/office/drawing/2014/main" id="{4D6C5E15-BD18-4095-C983-B20BEF1D6E34}"/>
+                <a16:creationId xmlns:a16="http://schemas.microsoft.com/office/drawing/2014/main" id="{4A93A168-327B-4DBF-B65A-34EA52DC7759}"/>
               </a:ext>
             </a:extLst>
           </p:cNvPr>
@@ -8655,57 +8656,70 @@
             <p:ph type="title"/>
           </p:nvPr>
         </p:nvSpPr>
-        <p:spPr/>
-        <p:txBody>
-          <a:bodyPr/>
+        <p:spPr>
+          <a:xfrm>
+            <a:off x="1023629" y="0"/>
+            <a:ext cx="10144741" cy="663606"/>
+          </a:xfrm>
+        </p:spPr>
+        <p:txBody>
+          <a:bodyPr>
+            <a:normAutofit fontScale="90000"/>
+          </a:bodyPr>
           <a:lstStyle/>
           <a:p>
             <a:r>
               <a:rPr lang="en-US" dirty="0"/>
-              <a:t>LAST PAGES</a:t>
-            </a:r>
-          </a:p>
-        </p:txBody>
-      </p:sp>
-      <p:sp>
-        <p:nvSpPr>
-          <p:cNvPr id="3" name="Content Placeholder 2">
+              <a:t>Comparing </a:t>
+            </a:r>
+            <a:r>
+              <a:rPr lang="en-US" dirty="0" err="1"/>
+              <a:t>DenStream</a:t>
+            </a:r>
+            <a:endParaRPr lang="en-US" dirty="0"/>
+          </a:p>
+        </p:txBody>
+      </p:sp>
+      <p:pic>
+        <p:nvPicPr>
+          <p:cNvPr id="5" name="Picture 4">
             <a:extLst>
               <a:ext uri="{FF2B5EF4-FFF2-40B4-BE49-F238E27FC236}">
-                <a16:creationId xmlns:a16="http://schemas.microsoft.com/office/drawing/2014/main" id="{92F0A45B-8E45-DB6A-4A36-FBF1F11FDAB1}"/>
+                <a16:creationId xmlns:a16="http://schemas.microsoft.com/office/drawing/2014/main" id="{E315FD2C-6CDD-4784-AA05-5D9AFE49C28F}"/>
               </a:ext>
             </a:extLst>
           </p:cNvPr>
-          <p:cNvSpPr>
-            <a:spLocks noGrp="1"/>
-          </p:cNvSpPr>
-          <p:nvPr>
-            <p:ph idx="1"/>
-          </p:nvPr>
-        </p:nvSpPr>
-        <p:spPr/>
-        <p:txBody>
-          <a:bodyPr/>
-          <a:lstStyle/>
-          <a:p>
-            <a:pPr marL="0" indent="0">
-              <a:buNone/>
-            </a:pPr>
-            <a:r>
-              <a:rPr lang="en-US" dirty="0"/>
-              <a:t>summarize the latest research achievements in this field and introduce some new strategies to deal with outliers and noise data</a:t>
-            </a:r>
-            <a:endParaRPr lang="fa-IR" dirty="0"/>
-          </a:p>
-          <a:p>
-            <a:endParaRPr lang="en-US" dirty="0"/>
-          </a:p>
-        </p:txBody>
-      </p:sp>
+          <p:cNvPicPr>
+            <a:picLocks noChangeAspect="1"/>
+          </p:cNvPicPr>
+          <p:nvPr/>
+        </p:nvPicPr>
+        <p:blipFill>
+          <a:blip r:embed="rId2">
+            <a:extLst>
+              <a:ext uri="{28A0092B-C50C-407E-A947-70E740481C1C}">
+                <a14:useLocalDpi xmlns:a14="http://schemas.microsoft.com/office/drawing/2010/main" val="0"/>
+              </a:ext>
+            </a:extLst>
+          </a:blip>
+          <a:stretch>
+            <a:fillRect/>
+          </a:stretch>
+        </p:blipFill>
+        <p:spPr>
+          <a:xfrm>
+            <a:off x="374341" y="663606"/>
+            <a:ext cx="11443317" cy="6115023"/>
+          </a:xfrm>
+          <a:prstGeom prst="rect">
+            <a:avLst/>
+          </a:prstGeom>
+        </p:spPr>
+      </p:pic>
     </p:spTree>
     <p:extLst>
       <p:ext uri="{BB962C8B-B14F-4D97-AF65-F5344CB8AC3E}">
-        <p14:creationId xmlns:p14="http://schemas.microsoft.com/office/powerpoint/2010/main" val="2973134573"/>
+        <p14:creationId xmlns:p14="http://schemas.microsoft.com/office/powerpoint/2010/main" val="350330893"/>
       </p:ext>
     </p:extLst>
   </p:cSld>
@@ -8737,7 +8751,7 @@
           <p:cNvPr id="2" name="Title 1">
             <a:extLst>
               <a:ext uri="{FF2B5EF4-FFF2-40B4-BE49-F238E27FC236}">
-                <a16:creationId xmlns:a16="http://schemas.microsoft.com/office/drawing/2014/main" id="{8329312B-A182-AE3F-7D05-3F812CE08210}"/>
+                <a16:creationId xmlns:a16="http://schemas.microsoft.com/office/drawing/2014/main" id="{4D6C5E15-BD18-4095-C983-B20BEF1D6E34}"/>
               </a:ext>
             </a:extLst>
           </p:cNvPr>
@@ -8755,7 +8769,7 @@
           <a:p>
             <a:r>
               <a:rPr lang="en-US" dirty="0"/>
-              <a:t>Future</a:t>
+              <a:t>LAST PAGES</a:t>
             </a:r>
           </a:p>
         </p:txBody>
@@ -8765,7 +8779,7 @@
           <p:cNvPr id="3" name="Content Placeholder 2">
             <a:extLst>
               <a:ext uri="{FF2B5EF4-FFF2-40B4-BE49-F238E27FC236}">
-                <a16:creationId xmlns:a16="http://schemas.microsoft.com/office/drawing/2014/main" id="{1E61828E-ED8F-1DC2-3F85-F1D64B83942C}"/>
+                <a16:creationId xmlns:a16="http://schemas.microsoft.com/office/drawing/2014/main" id="{92F0A45B-8E45-DB6A-4A36-FBF1F11FDAB1}"/>
               </a:ext>
             </a:extLst>
           </p:cNvPr>
@@ -8786,12 +8800,9 @@
             </a:pPr>
             <a:r>
               <a:rPr lang="en-US" dirty="0"/>
-              <a:t>focal points and difficulties of future research for data stream clustering</a:t>
-            </a:r>
-            <a:r>
-              <a:rPr lang="fa-IR" dirty="0"/>
-              <a:t>:</a:t>
-            </a:r>
+              <a:t>summarize the latest research achievements in this field and introduce some new strategies to deal with outliers and noise data</a:t>
+            </a:r>
+            <a:endParaRPr lang="fa-IR" dirty="0"/>
           </a:p>
           <a:p>
             <a:endParaRPr lang="en-US" dirty="0"/>
@@ -8801,7 +8812,7 @@
     </p:spTree>
     <p:extLst>
       <p:ext uri="{BB962C8B-B14F-4D97-AF65-F5344CB8AC3E}">
-        <p14:creationId xmlns:p14="http://schemas.microsoft.com/office/powerpoint/2010/main" val="698219641"/>
+        <p14:creationId xmlns:p14="http://schemas.microsoft.com/office/powerpoint/2010/main" val="2973134573"/>
       </p:ext>
     </p:extLst>
   </p:cSld>
@@ -8833,6 +8844,102 @@
           <p:cNvPr id="2" name="Title 1">
             <a:extLst>
               <a:ext uri="{FF2B5EF4-FFF2-40B4-BE49-F238E27FC236}">
+                <a16:creationId xmlns:a16="http://schemas.microsoft.com/office/drawing/2014/main" id="{8329312B-A182-AE3F-7D05-3F812CE08210}"/>
+              </a:ext>
+            </a:extLst>
+          </p:cNvPr>
+          <p:cNvSpPr>
+            <a:spLocks noGrp="1"/>
+          </p:cNvSpPr>
+          <p:nvPr>
+            <p:ph type="title"/>
+          </p:nvPr>
+        </p:nvSpPr>
+        <p:spPr/>
+        <p:txBody>
+          <a:bodyPr/>
+          <a:lstStyle/>
+          <a:p>
+            <a:r>
+              <a:rPr lang="en-US" dirty="0"/>
+              <a:t>Future</a:t>
+            </a:r>
+          </a:p>
+        </p:txBody>
+      </p:sp>
+      <p:sp>
+        <p:nvSpPr>
+          <p:cNvPr id="3" name="Content Placeholder 2">
+            <a:extLst>
+              <a:ext uri="{FF2B5EF4-FFF2-40B4-BE49-F238E27FC236}">
+                <a16:creationId xmlns:a16="http://schemas.microsoft.com/office/drawing/2014/main" id="{1E61828E-ED8F-1DC2-3F85-F1D64B83942C}"/>
+              </a:ext>
+            </a:extLst>
+          </p:cNvPr>
+          <p:cNvSpPr>
+            <a:spLocks noGrp="1"/>
+          </p:cNvSpPr>
+          <p:nvPr>
+            <p:ph idx="1"/>
+          </p:nvPr>
+        </p:nvSpPr>
+        <p:spPr/>
+        <p:txBody>
+          <a:bodyPr/>
+          <a:lstStyle/>
+          <a:p>
+            <a:pPr marL="0" indent="0">
+              <a:buNone/>
+            </a:pPr>
+            <a:r>
+              <a:rPr lang="en-US" dirty="0"/>
+              <a:t>focal points and difficulties of future research for data stream clustering</a:t>
+            </a:r>
+            <a:r>
+              <a:rPr lang="fa-IR" dirty="0"/>
+              <a:t>:</a:t>
+            </a:r>
+          </a:p>
+          <a:p>
+            <a:endParaRPr lang="en-US" dirty="0"/>
+          </a:p>
+        </p:txBody>
+      </p:sp>
+    </p:spTree>
+    <p:extLst>
+      <p:ext uri="{BB962C8B-B14F-4D97-AF65-F5344CB8AC3E}">
+        <p14:creationId xmlns:p14="http://schemas.microsoft.com/office/powerpoint/2010/main" val="698219641"/>
+      </p:ext>
+    </p:extLst>
+  </p:cSld>
+  <p:clrMapOvr>
+    <a:masterClrMapping/>
+  </p:clrMapOvr>
+</p:sld>
+</file>
+
+<file path=ppt/slides/slide25.xml><?xml version="1.0" encoding="utf-8"?>
+<p:sld xmlns:a="http://schemas.openxmlformats.org/drawingml/2006/main" xmlns:r="http://schemas.openxmlformats.org/officeDocument/2006/relationships" xmlns:p="http://schemas.openxmlformats.org/presentationml/2006/main">
+  <p:cSld>
+    <p:spTree>
+      <p:nvGrpSpPr>
+        <p:cNvPr id="1" name=""/>
+        <p:cNvGrpSpPr/>
+        <p:nvPr/>
+      </p:nvGrpSpPr>
+      <p:grpSpPr>
+        <a:xfrm>
+          <a:off x="0" y="0"/>
+          <a:ext cx="0" cy="0"/>
+          <a:chOff x="0" y="0"/>
+          <a:chExt cx="0" cy="0"/>
+        </a:xfrm>
+      </p:grpSpPr>
+      <p:sp>
+        <p:nvSpPr>
+          <p:cNvPr id="2" name="Title 1">
+            <a:extLst>
+              <a:ext uri="{FF2B5EF4-FFF2-40B4-BE49-F238E27FC236}">
                 <a16:creationId xmlns:a16="http://schemas.microsoft.com/office/drawing/2014/main" id="{AF1B050C-B724-3834-882B-56BEC9ABEF6C}"/>
               </a:ext>
             </a:extLst>
@@ -8892,93 +8999,90 @@
           </a:bodyPr>
           <a:lstStyle/>
           <a:p>
-            <a:endParaRPr lang="en-US" sz="1800" dirty="0"/>
-          </a:p>
-          <a:p>
-            <a:r>
-              <a:rPr lang="en-US" sz="1800" dirty="0">
+            <a:r>
+              <a:rPr lang="en-US" sz="1400" dirty="0">
                 <a:hlinkClick r:id="rId2"/>
               </a:rPr>
               <a:t>https://www.sciencedirect.com/science/article/abs/pii/S0167739X19312786</a:t>
             </a:r>
-            <a:endParaRPr lang="en-US" sz="1800" dirty="0"/>
-          </a:p>
-          <a:p>
-            <a:r>
-              <a:rPr lang="en-US" sz="1800" dirty="0">
+            <a:endParaRPr lang="en-US" sz="1400" dirty="0"/>
+          </a:p>
+          <a:p>
+            <a:r>
+              <a:rPr lang="en-US" sz="1400" dirty="0">
                 <a:hlinkClick r:id="rId3"/>
               </a:rPr>
               <a:t>https://www.researchgate.net/figure/Overview-of-the-proposed-two-step-clustering-method-The-first-step-uses-Birch-clustering_fig4_357972949</a:t>
             </a:r>
             <a:r>
-              <a:rPr lang="en-US" sz="1800" dirty="0">
+              <a:rPr lang="en-US" sz="1400" dirty="0">
                 <a:hlinkClick r:id="rId4"/>
               </a:rPr>
               <a:t>https://www.oreilly.com/library/view/data-mining-and/9781118868706/9781118868706c21.xhtml</a:t>
             </a:r>
-            <a:endParaRPr lang="en-US" sz="1800" dirty="0"/>
-          </a:p>
-          <a:p>
-            <a:r>
-              <a:rPr lang="en-US" sz="1800" dirty="0">
+            <a:endParaRPr lang="en-US" sz="1400" dirty="0"/>
+          </a:p>
+          <a:p>
+            <a:r>
+              <a:rPr lang="en-US" sz="1400" dirty="0">
                 <a:hlinkClick r:id="rId5"/>
               </a:rPr>
               <a:t>https://scikit-learn.org/stable/modules/generated/sklearn.cluster.Birch.html</a:t>
             </a:r>
-            <a:endParaRPr lang="en-US" sz="1800" dirty="0"/>
-          </a:p>
-          <a:p>
-            <a:r>
-              <a:rPr lang="en-US" sz="1800" dirty="0">
+            <a:endParaRPr lang="en-US" sz="1400" dirty="0"/>
+          </a:p>
+          <a:p>
+            <a:r>
+              <a:rPr lang="en-US" sz="1400" dirty="0">
                 <a:hlinkClick r:id="rId6"/>
               </a:rPr>
               <a:t>https://www.geeksforgeeks.org/ml-birch-clustering/</a:t>
             </a:r>
-            <a:endParaRPr lang="fa-IR" sz="1800" dirty="0">
+            <a:endParaRPr lang="fa-IR" sz="1400" dirty="0">
               <a:hlinkClick r:id="rId7"/>
             </a:endParaRPr>
           </a:p>
           <a:p>
             <a:r>
-              <a:rPr lang="en-US" sz="1800" dirty="0">
+              <a:rPr lang="en-US" sz="1400" dirty="0">
                 <a:hlinkClick r:id="rId7"/>
               </a:rPr>
               <a:t>https://en.wikipedia.org/wiki/Data_stream_clustering</a:t>
             </a:r>
-            <a:endParaRPr lang="en-US" sz="1800" dirty="0"/>
-          </a:p>
-          <a:p>
-            <a:r>
-              <a:rPr lang="en-US" sz="1800" dirty="0">
+            <a:endParaRPr lang="en-US" sz="1400" dirty="0"/>
+          </a:p>
+          <a:p>
+            <a:r>
+              <a:rPr lang="en-US" sz="1400" dirty="0">
                 <a:hlinkClick r:id="rId8"/>
               </a:rPr>
               <a:t>https://medium.com/@noel.cs21/balanced-iterative-reducing-and-clustering-using-heirachies-birch-5680adffaa58</a:t>
             </a:r>
             <a:r>
-              <a:rPr lang="en-US" sz="1800" dirty="0">
+              <a:rPr lang="en-US" sz="1400" dirty="0">
                 <a:hlinkClick r:id="rId9"/>
               </a:rPr>
               <a:t>https://www.youtube.com/watch?v=YWcDgX_pN-8</a:t>
             </a:r>
-            <a:endParaRPr lang="en-US" sz="1800" dirty="0"/>
-          </a:p>
-          <a:p>
-            <a:r>
-              <a:rPr lang="en-US" sz="1800" dirty="0">
+            <a:endParaRPr lang="en-US" sz="1400" dirty="0"/>
+          </a:p>
+          <a:p>
+            <a:r>
+              <a:rPr lang="en-US" sz="1400" dirty="0">
                 <a:hlinkClick r:id="rId10"/>
               </a:rPr>
               <a:t>https://www.youtube.com/watch?v=A4MzbYc4yCY</a:t>
             </a:r>
-            <a:endParaRPr lang="en-US" sz="1800" dirty="0"/>
-          </a:p>
-          <a:p>
-            <a:r>
-              <a:rPr lang="en-US" sz="1800" dirty="0">
+            <a:endParaRPr lang="en-US" sz="1400" dirty="0"/>
+          </a:p>
+          <a:p>
+            <a:r>
+              <a:rPr lang="en-US" sz="1400" dirty="0">
                 <a:hlinkClick r:id="rId2"/>
               </a:rPr>
               <a:t>https://www.sciencedirect.com/science/article/abs/pii/S0167739X19312786</a:t>
             </a:r>
-            <a:endParaRPr lang="fa-IR" sz="1800" dirty="0"/>
+            <a:endParaRPr lang="fa-IR" sz="1400" dirty="0"/>
           </a:p>
           <a:p>
             <a:r>
@@ -8992,7 +9096,7 @@
               </a:rPr>
               <a:t>https://doi.org/10.1016/j.future.2020.01.017</a:t>
             </a:r>
-            <a:endParaRPr lang="fa-IR" sz="1800" b="0" i="0" u="none" strike="noStrike" dirty="0">
+            <a:endParaRPr lang="fa-IR" sz="1400" b="0" i="0" u="none" strike="noStrike" dirty="0">
               <a:solidFill>
                 <a:srgbClr val="1F1F1F"/>
               </a:solidFill>
@@ -9001,7 +9105,58 @@
             </a:endParaRPr>
           </a:p>
           <a:p>
-            <a:endParaRPr lang="en-US" sz="1800" dirty="0"/>
+            <a:r>
+              <a:rPr lang="en-US" sz="1400" dirty="0">
+                <a:solidFill>
+                  <a:srgbClr val="1F1F1F"/>
+                </a:solidFill>
+                <a:latin typeface="ElsevierSans"/>
+                <a:hlinkClick r:id="rId12"/>
+              </a:rPr>
+              <a:t>https://www.logsign.com/blog/data-stream-clustering-methods-examples</a:t>
+            </a:r>
+            <a:endParaRPr lang="fa-IR" sz="1400" dirty="0">
+              <a:solidFill>
+                <a:srgbClr val="1F1F1F"/>
+              </a:solidFill>
+              <a:latin typeface="ElsevierSans"/>
+            </a:endParaRPr>
+          </a:p>
+          <a:p>
+            <a:r>
+              <a:rPr lang="en-US" sz="1400" dirty="0">
+                <a:solidFill>
+                  <a:srgbClr val="1F1F1F"/>
+                </a:solidFill>
+                <a:latin typeface="ElsevierSans"/>
+                <a:hlinkClick r:id="rId13"/>
+              </a:rPr>
+              <a:t>https://arxiv.org/abs/2210.08212</a:t>
+            </a:r>
+            <a:endParaRPr lang="en-US" sz="1400" dirty="0">
+              <a:solidFill>
+                <a:srgbClr val="1F1F1F"/>
+              </a:solidFill>
+              <a:latin typeface="ElsevierSans"/>
+            </a:endParaRPr>
+          </a:p>
+          <a:p>
+            <a:r>
+              <a:rPr lang="en-US" sz="1400" dirty="0">
+                <a:solidFill>
+                  <a:srgbClr val="1F1F1F"/>
+                </a:solidFill>
+                <a:latin typeface="ElsevierSans"/>
+                <a:hlinkClick r:id="rId14"/>
+              </a:rPr>
+              <a:t>https://github.com/dple/awesome-papers-and-source-code-for-anomaly-detection</a:t>
+            </a:r>
+            <a:endParaRPr lang="en-US" sz="1400" dirty="0">
+              <a:solidFill>
+                <a:srgbClr val="1F1F1F"/>
+              </a:solidFill>
+              <a:latin typeface="ElsevierSans"/>
+            </a:endParaRPr>
           </a:p>
         </p:txBody>
       </p:sp>
@@ -9764,12 +9919,14 @@
         </p:nvSpPr>
         <p:spPr>
           <a:xfrm>
-            <a:off x="1559812" y="249573"/>
-            <a:ext cx="10018713" cy="731939"/>
+            <a:off x="1086643" y="1"/>
+            <a:ext cx="10018713" cy="541538"/>
           </a:xfrm>
         </p:spPr>
         <p:txBody>
-          <a:bodyPr/>
+          <a:bodyPr>
+            <a:normAutofit fontScale="90000"/>
+          </a:bodyPr>
           <a:lstStyle/>
           <a:p>
             <a:r>
@@ -9808,8 +9965,8 @@
         </p:blipFill>
         <p:spPr bwMode="auto">
           <a:xfrm>
-            <a:off x="2478333" y="855952"/>
-            <a:ext cx="8335075" cy="5880016"/>
+            <a:off x="1928462" y="660642"/>
+            <a:ext cx="8591577" cy="6104141"/>
           </a:xfrm>
           <a:prstGeom prst="rect">
             <a:avLst/>

</xml_diff>